<commit_message>
Updated PPT with Video URL
Updated PPT with Video URL
</commit_message>
<xml_diff>
--- a/PPT/Logistics  Inventory Management_TeamISecG7.pptx
+++ b/PPT/Logistics  Inventory Management_TeamISecG7.pptx
@@ -214,7 +214,7 @@
           <a:p>
             <a:fld id="{CA466F15-7CD8-41E5-9862-75DA23C62CEF}" type="datetimeFigureOut">
               <a:rPr lang="en-US" smtClean="0"/>
-              <a:t>10/30/2015</a:t>
+              <a:t>11/1/2015</a:t>
             </a:fld>
             <a:endParaRPr lang="en-US"/>
           </a:p>
@@ -697,7 +697,7 @@
           <a:p>
             <a:fld id="{C1AFD635-6E46-4A11-87DC-092C041F7ADD}" type="datetime1">
               <a:rPr lang="en-US" smtClean="0"/>
-              <a:t>10/30/2015</a:t>
+              <a:t>11/1/2015</a:t>
             </a:fld>
             <a:endParaRPr lang="en-US"/>
           </a:p>
@@ -871,7 +871,7 @@
           <a:p>
             <a:fld id="{C875E1D0-64DD-41A2-8B19-7DDEDDDF3F12}" type="datetime1">
               <a:rPr lang="en-US" smtClean="0"/>
-              <a:t>10/30/2015</a:t>
+              <a:t>11/1/2015</a:t>
             </a:fld>
             <a:endParaRPr lang="en-US"/>
           </a:p>
@@ -1055,7 +1055,7 @@
           <a:p>
             <a:fld id="{1BB3605E-300E-4491-BF8F-49BE779EA7C0}" type="datetime1">
               <a:rPr lang="en-US" smtClean="0"/>
-              <a:t>10/30/2015</a:t>
+              <a:t>11/1/2015</a:t>
             </a:fld>
             <a:endParaRPr lang="en-US"/>
           </a:p>
@@ -1229,7 +1229,7 @@
           <a:p>
             <a:fld id="{A86E4137-FE6D-4F1B-B1A0-5148BF85B436}" type="datetime1">
               <a:rPr lang="en-US" smtClean="0"/>
-              <a:t>10/30/2015</a:t>
+              <a:t>11/1/2015</a:t>
             </a:fld>
             <a:endParaRPr lang="en-US"/>
           </a:p>
@@ -1479,7 +1479,7 @@
           <a:p>
             <a:fld id="{04AF0405-C3F7-458D-9DEA-759455EDA878}" type="datetime1">
               <a:rPr lang="en-US" smtClean="0"/>
-              <a:t>10/30/2015</a:t>
+              <a:t>11/1/2015</a:t>
             </a:fld>
             <a:endParaRPr lang="en-US"/>
           </a:p>
@@ -1715,7 +1715,7 @@
           <a:p>
             <a:fld id="{859DAB8B-B93C-4574-9123-4F43C66D048C}" type="datetime1">
               <a:rPr lang="en-US" smtClean="0"/>
-              <a:t>10/30/2015</a:t>
+              <a:t>11/1/2015</a:t>
             </a:fld>
             <a:endParaRPr lang="en-US"/>
           </a:p>
@@ -2086,7 +2086,7 @@
           <a:p>
             <a:fld id="{297B360D-D1D5-43B9-B6A0-F65541F505E9}" type="datetime1">
               <a:rPr lang="en-US" smtClean="0"/>
-              <a:t>10/30/2015</a:t>
+              <a:t>11/1/2015</a:t>
             </a:fld>
             <a:endParaRPr lang="en-US"/>
           </a:p>
@@ -2208,7 +2208,7 @@
           <a:p>
             <a:fld id="{9B3D5E96-2A1E-4B06-90F6-D2C516DB51AE}" type="datetime1">
               <a:rPr lang="en-US" smtClean="0"/>
-              <a:t>10/30/2015</a:t>
+              <a:t>11/1/2015</a:t>
             </a:fld>
             <a:endParaRPr lang="en-US"/>
           </a:p>
@@ -2307,7 +2307,7 @@
           <a:p>
             <a:fld id="{C1E3D268-F04F-488A-9FC3-8B4A3BE0FD10}" type="datetime1">
               <a:rPr lang="en-US" smtClean="0"/>
-              <a:t>10/30/2015</a:t>
+              <a:t>11/1/2015</a:t>
             </a:fld>
             <a:endParaRPr lang="en-US"/>
           </a:p>
@@ -2588,7 +2588,7 @@
           <a:p>
             <a:fld id="{4D33ED00-284B-42F3-B6B4-810BA6D32FD5}" type="datetime1">
               <a:rPr lang="en-US" smtClean="0"/>
-              <a:t>10/30/2015</a:t>
+              <a:t>11/1/2015</a:t>
             </a:fld>
             <a:endParaRPr lang="en-US"/>
           </a:p>
@@ -2845,7 +2845,7 @@
           <a:p>
             <a:fld id="{2024E467-75D3-49A1-9AF8-2CCA5CE57921}" type="datetime1">
               <a:rPr lang="en-US" smtClean="0"/>
-              <a:t>10/30/2015</a:t>
+              <a:t>11/1/2015</a:t>
             </a:fld>
             <a:endParaRPr lang="en-US"/>
           </a:p>
@@ -3062,7 +3062,7 @@
           <a:p>
             <a:fld id="{10F55D94-A789-49B9-8DF6-736E91E5CDD1}" type="datetime1">
               <a:rPr lang="en-US" smtClean="0"/>
-              <a:t>10/30/2015</a:t>
+              <a:t>11/1/2015</a:t>
             </a:fld>
             <a:endParaRPr lang="en-US"/>
           </a:p>
@@ -3856,10 +3856,6 @@
               <a:rPr lang="en-US" sz="2800" dirty="0" smtClean="0"/>
               <a:t>Screenshots : Delete Product from Inventory</a:t>
             </a:r>
-            <a:r>
-              <a:rPr lang="en-US" sz="2800" dirty="0" smtClean="0"/>
-              <a:t/>
-            </a:r>
             <a:br>
               <a:rPr lang="en-US" sz="2800" dirty="0" smtClean="0"/>
             </a:br>
@@ -4232,10 +4228,6 @@
               <a:rPr lang="en-US" sz="2800" dirty="0" smtClean="0"/>
               <a:t>Screenshots : Add Material to Inventory</a:t>
             </a:r>
-            <a:r>
-              <a:rPr lang="en-US" sz="2800" dirty="0" smtClean="0"/>
-              <a:t/>
-            </a:r>
             <a:br>
               <a:rPr lang="en-US" sz="2800" dirty="0" smtClean="0"/>
             </a:br>
@@ -4602,10 +4594,6 @@
             <a:r>
               <a:rPr lang="en-US" sz="2800" dirty="0" smtClean="0"/>
               <a:t>Screenshots : Generate Charts</a:t>
-            </a:r>
-            <a:r>
-              <a:rPr lang="en-US" sz="2800" dirty="0" smtClean="0"/>
-              <a:t/>
             </a:r>
             <a:br>
               <a:rPr lang="en-US" sz="2800" dirty="0" smtClean="0"/>
@@ -5229,8 +5217,34 @@
           <a:p>
             <a:r>
               <a:rPr lang="en-US" sz="1600" dirty="0" smtClean="0"/>
-              <a:t>Demo Video :</a:t>
-            </a:r>
+              <a:t>Demo Video </a:t>
+            </a:r>
+            <a:r>
+              <a:rPr lang="en-US" sz="1600"/>
+              <a:t>: </a:t>
+            </a:r>
+            <a:r>
+              <a:rPr lang="en-US" sz="1600">
+                <a:hlinkClick r:id="rId4"/>
+              </a:rPr>
+              <a:t>https</a:t>
+            </a:r>
+            <a:r>
+              <a:rPr lang="en-US" sz="1600">
+                <a:hlinkClick r:id="rId4"/>
+              </a:rPr>
+              <a:t>://</a:t>
+            </a:r>
+            <a:r>
+              <a:rPr lang="en-US" sz="1600" smtClean="0">
+                <a:hlinkClick r:id="rId4"/>
+              </a:rPr>
+              <a:t>drive.google.com/file/d/0B4ElRFTt0gAEejFpWXF5dUozbjQ/view?usp=sharing</a:t>
+            </a:r>
+            <a:endParaRPr lang="en-US" sz="1600" smtClean="0"/>
+          </a:p>
+          <a:p>
+            <a:endParaRPr lang="en-US" sz="1600" dirty="0" smtClean="0"/>
           </a:p>
           <a:p>
             <a:endParaRPr lang="en-US" sz="1600" dirty="0" smtClean="0"/>
@@ -5807,17 +5821,8 @@
           <a:p>
             <a:r>
               <a:rPr lang="en-US" sz="2800" dirty="0"/>
-              <a:t>Reasons behind technologies </a:t>
-            </a:r>
-            <a:r>
-              <a:rPr lang="en-US" sz="2800" dirty="0"/>
-              <a:t>u</a:t>
-            </a:r>
-            <a:r>
-              <a:rPr lang="en-US" sz="2800" dirty="0"/>
-              <a:t>sed</a:t>
-            </a:r>
-            <a:endParaRPr lang="en-US" sz="2800" dirty="0"/>
+              <a:t>Reasons behind technologies used</a:t>
+            </a:r>
           </a:p>
         </p:txBody>
       </p:sp>
@@ -6089,7 +6094,6 @@
               <a:rPr lang="en-US" sz="2800" dirty="0"/>
               <a:t>WebApp Usability</a:t>
             </a:r>
-            <a:endParaRPr lang="en-US" sz="2800" dirty="0"/>
           </a:p>
         </p:txBody>
       </p:sp>
@@ -6480,10 +6484,6 @@
               <a:rPr lang="en-US" sz="2800" dirty="0" smtClean="0"/>
               <a:t>Screenshots : Dashboard</a:t>
             </a:r>
-            <a:r>
-              <a:rPr lang="en-US" sz="2800" dirty="0" smtClean="0"/>
-              <a:t/>
-            </a:r>
             <a:br>
               <a:rPr lang="en-US" sz="2800" dirty="0" smtClean="0"/>
             </a:br>
@@ -6845,10 +6845,6 @@
             <a:r>
               <a:rPr lang="en-US" sz="2800" dirty="0" smtClean="0"/>
               <a:t>Screenshots : Add Product to Inventory</a:t>
-            </a:r>
-            <a:r>
-              <a:rPr lang="en-US" sz="2800" dirty="0" smtClean="0"/>
-              <a:t/>
             </a:r>
             <a:br>
               <a:rPr lang="en-US" sz="2800" dirty="0" smtClean="0"/>

</xml_diff>